<commit_message>
Analysis ready to go
</commit_message>
<xml_diff>
--- a/Appendixes/FinalAnalysis.pptx
+++ b/Appendixes/FinalAnalysis.pptx
@@ -12,18 +12,11 @@
     <p:sldId id="278" r:id="rId6"/>
     <p:sldId id="259" r:id="rId7"/>
     <p:sldId id="279" r:id="rId8"/>
-    <p:sldId id="261" r:id="rId9"/>
-    <p:sldId id="262" r:id="rId10"/>
-    <p:sldId id="263" r:id="rId11"/>
-    <p:sldId id="264" r:id="rId12"/>
-    <p:sldId id="265" r:id="rId13"/>
-    <p:sldId id="266" r:id="rId14"/>
-    <p:sldId id="267" r:id="rId15"/>
-    <p:sldId id="268" r:id="rId16"/>
-    <p:sldId id="269" r:id="rId17"/>
-    <p:sldId id="270" r:id="rId18"/>
-    <p:sldId id="271" r:id="rId19"/>
-    <p:sldId id="281" r:id="rId20"/>
+    <p:sldId id="264" r:id="rId9"/>
+    <p:sldId id="269" r:id="rId10"/>
+    <p:sldId id="270" r:id="rId11"/>
+    <p:sldId id="271" r:id="rId12"/>
+    <p:sldId id="281" r:id="rId13"/>
   </p:sldIdLst>
   <p:sldSz cx="9144000" cy="6858000" type="screen4x3"/>
   <p:notesSz cx="6858000" cy="9144000"/>
@@ -306,7 +299,7 @@
           <a:p>
             <a:fld id="{915CE8DE-7336-42DB-A64B-387B2E587464}" type="datetimeFigureOut">
               <a:rPr lang="sk-SK" smtClean="0"/>
-              <a:t>20. 1. 2018</a:t>
+              <a:t>21. 1. 2018</a:t>
             </a:fld>
             <a:endParaRPr lang="sk-SK"/>
           </a:p>
@@ -476,7 +469,7 @@
           <a:p>
             <a:fld id="{915CE8DE-7336-42DB-A64B-387B2E587464}" type="datetimeFigureOut">
               <a:rPr lang="sk-SK" smtClean="0"/>
-              <a:t>20. 1. 2018</a:t>
+              <a:t>21. 1. 2018</a:t>
             </a:fld>
             <a:endParaRPr lang="sk-SK"/>
           </a:p>
@@ -656,7 +649,7 @@
           <a:p>
             <a:fld id="{915CE8DE-7336-42DB-A64B-387B2E587464}" type="datetimeFigureOut">
               <a:rPr lang="sk-SK" smtClean="0"/>
-              <a:t>20. 1. 2018</a:t>
+              <a:t>21. 1. 2018</a:t>
             </a:fld>
             <a:endParaRPr lang="sk-SK"/>
           </a:p>
@@ -826,7 +819,7 @@
           <a:p>
             <a:fld id="{915CE8DE-7336-42DB-A64B-387B2E587464}" type="datetimeFigureOut">
               <a:rPr lang="sk-SK" smtClean="0"/>
-              <a:t>20. 1. 2018</a:t>
+              <a:t>21. 1. 2018</a:t>
             </a:fld>
             <a:endParaRPr lang="sk-SK"/>
           </a:p>
@@ -1072,7 +1065,7 @@
           <a:p>
             <a:fld id="{915CE8DE-7336-42DB-A64B-387B2E587464}" type="datetimeFigureOut">
               <a:rPr lang="sk-SK" smtClean="0"/>
-              <a:t>20. 1. 2018</a:t>
+              <a:t>21. 1. 2018</a:t>
             </a:fld>
             <a:endParaRPr lang="sk-SK"/>
           </a:p>
@@ -1360,7 +1353,7 @@
           <a:p>
             <a:fld id="{915CE8DE-7336-42DB-A64B-387B2E587464}" type="datetimeFigureOut">
               <a:rPr lang="sk-SK" smtClean="0"/>
-              <a:t>20. 1. 2018</a:t>
+              <a:t>21. 1. 2018</a:t>
             </a:fld>
             <a:endParaRPr lang="sk-SK"/>
           </a:p>
@@ -1782,7 +1775,7 @@
           <a:p>
             <a:fld id="{915CE8DE-7336-42DB-A64B-387B2E587464}" type="datetimeFigureOut">
               <a:rPr lang="sk-SK" smtClean="0"/>
-              <a:t>20. 1. 2018</a:t>
+              <a:t>21. 1. 2018</a:t>
             </a:fld>
             <a:endParaRPr lang="sk-SK"/>
           </a:p>
@@ -1900,7 +1893,7 @@
           <a:p>
             <a:fld id="{915CE8DE-7336-42DB-A64B-387B2E587464}" type="datetimeFigureOut">
               <a:rPr lang="sk-SK" smtClean="0"/>
-              <a:t>20. 1. 2018</a:t>
+              <a:t>21. 1. 2018</a:t>
             </a:fld>
             <a:endParaRPr lang="sk-SK"/>
           </a:p>
@@ -1995,7 +1988,7 @@
           <a:p>
             <a:fld id="{915CE8DE-7336-42DB-A64B-387B2E587464}" type="datetimeFigureOut">
               <a:rPr lang="sk-SK" smtClean="0"/>
-              <a:t>20. 1. 2018</a:t>
+              <a:t>21. 1. 2018</a:t>
             </a:fld>
             <a:endParaRPr lang="sk-SK"/>
           </a:p>
@@ -2272,7 +2265,7 @@
           <a:p>
             <a:fld id="{915CE8DE-7336-42DB-A64B-387B2E587464}" type="datetimeFigureOut">
               <a:rPr lang="sk-SK" smtClean="0"/>
-              <a:t>20. 1. 2018</a:t>
+              <a:t>21. 1. 2018</a:t>
             </a:fld>
             <a:endParaRPr lang="sk-SK"/>
           </a:p>
@@ -2525,7 +2518,7 @@
           <a:p>
             <a:fld id="{915CE8DE-7336-42DB-A64B-387B2E587464}" type="datetimeFigureOut">
               <a:rPr lang="sk-SK" smtClean="0"/>
-              <a:t>20. 1. 2018</a:t>
+              <a:t>21. 1. 2018</a:t>
             </a:fld>
             <a:endParaRPr lang="sk-SK"/>
           </a:p>
@@ -2738,7 +2731,7 @@
           <a:p>
             <a:fld id="{915CE8DE-7336-42DB-A64B-387B2E587464}" type="datetimeFigureOut">
               <a:rPr lang="sk-SK" smtClean="0"/>
-              <a:t>20. 1. 2018</a:t>
+              <a:t>21. 1. 2018</a:t>
             </a:fld>
             <a:endParaRPr lang="sk-SK"/>
           </a:p>
@@ -3206,6 +3199,49 @@
       </p:grpSpPr>
       <p:sp>
         <p:nvSpPr>
+          <p:cNvPr id="3" name="Zástupný symbol obsahu 2"/>
+          <p:cNvSpPr>
+            <a:spLocks noGrp="1"/>
+          </p:cNvSpPr>
+          <p:nvPr>
+            <p:ph idx="1"/>
+          </p:nvPr>
+        </p:nvSpPr>
+        <p:spPr/>
+        <p:txBody>
+          <a:bodyPr/>
+          <a:lstStyle/>
+          <a:p>
+            <a:endParaRPr lang="sk-SK"/>
+          </a:p>
+        </p:txBody>
+      </p:sp>
+      <p:pic>
+        <p:nvPicPr>
+          <p:cNvPr id="4" name="image11.jpg"/>
+          <p:cNvPicPr/>
+          <p:nvPr/>
+        </p:nvPicPr>
+        <p:blipFill>
+          <a:blip r:embed="rId2"/>
+          <a:srcRect/>
+          <a:stretch>
+            <a:fillRect/>
+          </a:stretch>
+        </p:blipFill>
+        <p:spPr>
+          <a:xfrm>
+            <a:off x="251520" y="116632"/>
+            <a:ext cx="8496944" cy="6669360"/>
+          </a:xfrm>
+          <a:prstGeom prst="rect">
+            <a:avLst/>
+          </a:prstGeom>
+          <a:ln/>
+        </p:spPr>
+      </p:pic>
+      <p:sp>
+        <p:nvSpPr>
           <p:cNvPr id="2" name="Nadpis 1"/>
           <p:cNvSpPr>
             <a:spLocks noGrp="1"/>
@@ -3214,52 +3250,30 @@
             <p:ph type="title"/>
           </p:nvPr>
         </p:nvSpPr>
-        <p:spPr/>
-        <p:txBody>
-          <a:bodyPr/>
-          <a:lstStyle/>
-          <a:p>
-            <a:r>
-              <a:rPr lang="en-GB" dirty="0" smtClean="0"/>
-              <a:t>Lecturer</a:t>
-            </a:r>
-            <a:endParaRPr lang="sk-SK" dirty="0"/>
-          </a:p>
-        </p:txBody>
-      </p:sp>
-      <p:sp>
-        <p:nvSpPr>
-          <p:cNvPr id="3" name="Zástupný symbol obsahu 2"/>
-          <p:cNvSpPr>
-            <a:spLocks noGrp="1"/>
-          </p:cNvSpPr>
-          <p:nvPr>
-            <p:ph idx="1"/>
-          </p:nvPr>
-        </p:nvSpPr>
-        <p:spPr/>
-        <p:txBody>
-          <a:bodyPr/>
-          <a:lstStyle/>
-          <a:p>
-            <a:r>
-              <a:rPr lang="en-GB" dirty="0" smtClean="0"/>
-              <a:t>Store info about new lecturer</a:t>
-            </a:r>
-          </a:p>
-          <a:p>
-            <a:r>
-              <a:rPr lang="en-GB" dirty="0" smtClean="0"/>
-              <a:t>Search for lecturers of given category</a:t>
-            </a:r>
-            <a:endParaRPr lang="sk-SK" dirty="0"/>
+        <p:spPr>
+          <a:xfrm>
+            <a:off x="6217840" y="188640"/>
+            <a:ext cx="2890664" cy="1143000"/>
+          </a:xfrm>
+        </p:spPr>
+        <p:txBody>
+          <a:bodyPr>
+            <a:normAutofit/>
+          </a:bodyPr>
+          <a:lstStyle/>
+          <a:p>
+            <a:r>
+              <a:rPr lang="en-GB" sz="3200" dirty="0" smtClean="0"/>
+              <a:t>USE CASE DIAGRAM</a:t>
+            </a:r>
+            <a:endParaRPr lang="sk-SK" sz="3200" dirty="0"/>
           </a:p>
         </p:txBody>
       </p:sp>
     </p:spTree>
     <p:extLst>
       <p:ext uri="{BB962C8B-B14F-4D97-AF65-F5344CB8AC3E}">
-        <p14:creationId xmlns:p14="http://schemas.microsoft.com/office/powerpoint/2010/main" val="2148162219"/>
+        <p14:creationId xmlns:p14="http://schemas.microsoft.com/office/powerpoint/2010/main" val="2485981500"/>
       </p:ext>
     </p:extLst>
   </p:cSld>
@@ -3295,883 +3309,6 @@
       </p:grpSpPr>
       <p:sp>
         <p:nvSpPr>
-          <p:cNvPr id="2" name="Nadpis 1"/>
-          <p:cNvSpPr>
-            <a:spLocks noGrp="1"/>
-          </p:cNvSpPr>
-          <p:nvPr>
-            <p:ph type="title"/>
-          </p:nvPr>
-        </p:nvSpPr>
-        <p:spPr/>
-        <p:txBody>
-          <a:bodyPr/>
-          <a:lstStyle/>
-          <a:p>
-            <a:endParaRPr lang="sk-SK"/>
-          </a:p>
-        </p:txBody>
-      </p:sp>
-      <p:sp>
-        <p:nvSpPr>
-          <p:cNvPr id="3" name="Zástupný symbol obsahu 2"/>
-          <p:cNvSpPr>
-            <a:spLocks noGrp="1"/>
-          </p:cNvSpPr>
-          <p:nvPr>
-            <p:ph idx="1"/>
-          </p:nvPr>
-        </p:nvSpPr>
-        <p:spPr/>
-        <p:txBody>
-          <a:bodyPr/>
-          <a:lstStyle/>
-          <a:p>
-            <a:endParaRPr lang="sk-SK"/>
-          </a:p>
-        </p:txBody>
-      </p:sp>
-      <p:pic>
-        <p:nvPicPr>
-          <p:cNvPr id="4" name="image15.png"/>
-          <p:cNvPicPr/>
-          <p:nvPr/>
-        </p:nvPicPr>
-        <p:blipFill>
-          <a:blip r:embed="rId2"/>
-          <a:srcRect/>
-          <a:stretch>
-            <a:fillRect/>
-          </a:stretch>
-        </p:blipFill>
-        <p:spPr>
-          <a:xfrm>
-            <a:off x="683568" y="116632"/>
-            <a:ext cx="7632848" cy="6624736"/>
-          </a:xfrm>
-          <a:prstGeom prst="rect">
-            <a:avLst/>
-          </a:prstGeom>
-          <a:ln w="12700">
-            <a:solidFill>
-              <a:schemeClr val="tx1"/>
-            </a:solidFill>
-          </a:ln>
-        </p:spPr>
-      </p:pic>
-    </p:spTree>
-    <p:extLst>
-      <p:ext uri="{BB962C8B-B14F-4D97-AF65-F5344CB8AC3E}">
-        <p14:creationId xmlns:p14="http://schemas.microsoft.com/office/powerpoint/2010/main" val="984753232"/>
-      </p:ext>
-    </p:extLst>
-  </p:cSld>
-  <p:clrMapOvr>
-    <a:masterClrMapping/>
-  </p:clrMapOvr>
-  <p:timing>
-    <p:tnLst>
-      <p:par>
-        <p:cTn id="1" dur="indefinite" restart="never" nodeType="tmRoot"/>
-      </p:par>
-    </p:tnLst>
-  </p:timing>
-</p:sld>
-</file>
-
-<file path=ppt/slides/slide12.xml><?xml version="1.0" encoding="utf-8"?>
-<p:sld xmlns:a="http://schemas.openxmlformats.org/drawingml/2006/main" xmlns:r="http://schemas.openxmlformats.org/officeDocument/2006/relationships" xmlns:p="http://schemas.openxmlformats.org/presentationml/2006/main">
-  <p:cSld>
-    <p:spTree>
-      <p:nvGrpSpPr>
-        <p:cNvPr id="1" name=""/>
-        <p:cNvGrpSpPr/>
-        <p:nvPr/>
-      </p:nvGrpSpPr>
-      <p:grpSpPr>
-        <a:xfrm>
-          <a:off x="0" y="0"/>
-          <a:ext cx="0" cy="0"/>
-          <a:chOff x="0" y="0"/>
-          <a:chExt cx="0" cy="0"/>
-        </a:xfrm>
-      </p:grpSpPr>
-      <p:sp>
-        <p:nvSpPr>
-          <p:cNvPr id="2" name="Nadpis 1"/>
-          <p:cNvSpPr>
-            <a:spLocks noGrp="1"/>
-          </p:cNvSpPr>
-          <p:nvPr>
-            <p:ph type="title"/>
-          </p:nvPr>
-        </p:nvSpPr>
-        <p:spPr/>
-        <p:txBody>
-          <a:bodyPr/>
-          <a:lstStyle/>
-          <a:p>
-            <a:r>
-              <a:rPr lang="en-GB" dirty="0" smtClean="0"/>
-              <a:t>Event</a:t>
-            </a:r>
-            <a:endParaRPr lang="sk-SK" dirty="0"/>
-          </a:p>
-        </p:txBody>
-      </p:sp>
-      <p:sp>
-        <p:nvSpPr>
-          <p:cNvPr id="3" name="Zástupný symbol obsahu 2"/>
-          <p:cNvSpPr>
-            <a:spLocks noGrp="1"/>
-          </p:cNvSpPr>
-          <p:nvPr>
-            <p:ph idx="1"/>
-          </p:nvPr>
-        </p:nvSpPr>
-        <p:spPr/>
-        <p:txBody>
-          <a:bodyPr/>
-          <a:lstStyle/>
-          <a:p>
-            <a:r>
-              <a:rPr lang="en-GB" dirty="0" smtClean="0"/>
-              <a:t>Plan and modify event</a:t>
-            </a:r>
-          </a:p>
-          <a:p>
-            <a:r>
-              <a:rPr lang="en-GB" dirty="0" smtClean="0"/>
-              <a:t>Search for not finalized events</a:t>
-            </a:r>
-          </a:p>
-          <a:p>
-            <a:r>
-              <a:rPr lang="en-GB" dirty="0" smtClean="0"/>
-              <a:t>Return the amount of available places for every event</a:t>
-            </a:r>
-          </a:p>
-        </p:txBody>
-      </p:sp>
-    </p:spTree>
-    <p:extLst>
-      <p:ext uri="{BB962C8B-B14F-4D97-AF65-F5344CB8AC3E}">
-        <p14:creationId xmlns:p14="http://schemas.microsoft.com/office/powerpoint/2010/main" val="3290654635"/>
-      </p:ext>
-    </p:extLst>
-  </p:cSld>
-  <p:clrMapOvr>
-    <a:masterClrMapping/>
-  </p:clrMapOvr>
-  <p:timing>
-    <p:tnLst>
-      <p:par>
-        <p:cTn id="1" dur="indefinite" restart="never" nodeType="tmRoot"/>
-      </p:par>
-    </p:tnLst>
-  </p:timing>
-</p:sld>
-</file>
-
-<file path=ppt/slides/slide13.xml><?xml version="1.0" encoding="utf-8"?>
-<p:sld xmlns:a="http://schemas.openxmlformats.org/drawingml/2006/main" xmlns:r="http://schemas.openxmlformats.org/officeDocument/2006/relationships" xmlns:p="http://schemas.openxmlformats.org/presentationml/2006/main">
-  <p:cSld>
-    <p:spTree>
-      <p:nvGrpSpPr>
-        <p:cNvPr id="1" name=""/>
-        <p:cNvGrpSpPr/>
-        <p:nvPr/>
-      </p:nvGrpSpPr>
-      <p:grpSpPr>
-        <a:xfrm>
-          <a:off x="0" y="0"/>
-          <a:ext cx="0" cy="0"/>
-          <a:chOff x="0" y="0"/>
-          <a:chExt cx="0" cy="0"/>
-        </a:xfrm>
-      </p:grpSpPr>
-      <p:sp>
-        <p:nvSpPr>
-          <p:cNvPr id="2" name="Nadpis 1"/>
-          <p:cNvSpPr>
-            <a:spLocks noGrp="1"/>
-          </p:cNvSpPr>
-          <p:nvPr>
-            <p:ph type="title"/>
-          </p:nvPr>
-        </p:nvSpPr>
-        <p:spPr/>
-        <p:txBody>
-          <a:bodyPr/>
-          <a:lstStyle/>
-          <a:p>
-            <a:endParaRPr lang="sk-SK"/>
-          </a:p>
-        </p:txBody>
-      </p:sp>
-      <p:sp>
-        <p:nvSpPr>
-          <p:cNvPr id="3" name="Zástupný symbol obsahu 2"/>
-          <p:cNvSpPr>
-            <a:spLocks noGrp="1"/>
-          </p:cNvSpPr>
-          <p:nvPr>
-            <p:ph idx="1"/>
-          </p:nvPr>
-        </p:nvSpPr>
-        <p:spPr/>
-        <p:txBody>
-          <a:bodyPr/>
-          <a:lstStyle/>
-          <a:p>
-            <a:endParaRPr lang="sk-SK"/>
-          </a:p>
-        </p:txBody>
-      </p:sp>
-      <p:pic>
-        <p:nvPicPr>
-          <p:cNvPr id="4" name="image12.png"/>
-          <p:cNvPicPr/>
-          <p:nvPr/>
-        </p:nvPicPr>
-        <p:blipFill>
-          <a:blip r:embed="rId2"/>
-          <a:srcRect/>
-          <a:stretch>
-            <a:fillRect/>
-          </a:stretch>
-        </p:blipFill>
-        <p:spPr>
-          <a:xfrm>
-            <a:off x="899592" y="116632"/>
-            <a:ext cx="7272808" cy="6624735"/>
-          </a:xfrm>
-          <a:prstGeom prst="rect">
-            <a:avLst/>
-          </a:prstGeom>
-          <a:ln w="12700">
-            <a:solidFill>
-              <a:schemeClr val="tx1"/>
-            </a:solidFill>
-          </a:ln>
-        </p:spPr>
-      </p:pic>
-    </p:spTree>
-    <p:extLst>
-      <p:ext uri="{BB962C8B-B14F-4D97-AF65-F5344CB8AC3E}">
-        <p14:creationId xmlns:p14="http://schemas.microsoft.com/office/powerpoint/2010/main" val="641159412"/>
-      </p:ext>
-    </p:extLst>
-  </p:cSld>
-  <p:clrMapOvr>
-    <a:masterClrMapping/>
-  </p:clrMapOvr>
-  <p:timing>
-    <p:tnLst>
-      <p:par>
-        <p:cTn id="1" dur="indefinite" restart="never" nodeType="tmRoot"/>
-      </p:par>
-    </p:tnLst>
-  </p:timing>
-</p:sld>
-</file>
-
-<file path=ppt/slides/slide14.xml><?xml version="1.0" encoding="utf-8"?>
-<p:sld xmlns:a="http://schemas.openxmlformats.org/drawingml/2006/main" xmlns:r="http://schemas.openxmlformats.org/officeDocument/2006/relationships" xmlns:p="http://schemas.openxmlformats.org/presentationml/2006/main">
-  <p:cSld>
-    <p:spTree>
-      <p:nvGrpSpPr>
-        <p:cNvPr id="1" name=""/>
-        <p:cNvGrpSpPr/>
-        <p:nvPr/>
-      </p:nvGrpSpPr>
-      <p:grpSpPr>
-        <a:xfrm>
-          <a:off x="0" y="0"/>
-          <a:ext cx="0" cy="0"/>
-          <a:chOff x="0" y="0"/>
-          <a:chExt cx="0" cy="0"/>
-        </a:xfrm>
-      </p:grpSpPr>
-      <p:sp>
-        <p:nvSpPr>
-          <p:cNvPr id="2" name="Nadpis 1"/>
-          <p:cNvSpPr>
-            <a:spLocks noGrp="1"/>
-          </p:cNvSpPr>
-          <p:nvPr>
-            <p:ph type="title"/>
-          </p:nvPr>
-        </p:nvSpPr>
-        <p:spPr/>
-        <p:txBody>
-          <a:bodyPr/>
-          <a:lstStyle/>
-          <a:p>
-            <a:r>
-              <a:rPr lang="en-GB" dirty="0" smtClean="0"/>
-              <a:t>Newsletter</a:t>
-            </a:r>
-            <a:endParaRPr lang="sk-SK" dirty="0"/>
-          </a:p>
-        </p:txBody>
-      </p:sp>
-      <p:sp>
-        <p:nvSpPr>
-          <p:cNvPr id="3" name="Zástupný symbol obsahu 2"/>
-          <p:cNvSpPr>
-            <a:spLocks noGrp="1"/>
-          </p:cNvSpPr>
-          <p:nvPr>
-            <p:ph idx="1"/>
-          </p:nvPr>
-        </p:nvSpPr>
-        <p:spPr/>
-        <p:txBody>
-          <a:bodyPr/>
-          <a:lstStyle/>
-          <a:p>
-            <a:r>
-              <a:rPr lang="en-GB" dirty="0" smtClean="0"/>
-              <a:t>Collect list of lecturers who want a fee or advertisement</a:t>
-            </a:r>
-          </a:p>
-          <a:p>
-            <a:r>
-              <a:rPr lang="en-GB" dirty="0" smtClean="0"/>
-              <a:t>Collect list of finalized events</a:t>
-            </a:r>
-          </a:p>
-          <a:p>
-            <a:r>
-              <a:rPr lang="en-GB" dirty="0" smtClean="0"/>
-              <a:t>Generate newsletter</a:t>
-            </a:r>
-            <a:endParaRPr lang="sk-SK" dirty="0"/>
-          </a:p>
-        </p:txBody>
-      </p:sp>
-    </p:spTree>
-    <p:extLst>
-      <p:ext uri="{BB962C8B-B14F-4D97-AF65-F5344CB8AC3E}">
-        <p14:creationId xmlns:p14="http://schemas.microsoft.com/office/powerpoint/2010/main" val="2477443509"/>
-      </p:ext>
-    </p:extLst>
-  </p:cSld>
-  <p:clrMapOvr>
-    <a:masterClrMapping/>
-  </p:clrMapOvr>
-  <p:timing>
-    <p:tnLst>
-      <p:par>
-        <p:cTn id="1" dur="indefinite" restart="never" nodeType="tmRoot"/>
-      </p:par>
-    </p:tnLst>
-  </p:timing>
-</p:sld>
-</file>
-
-<file path=ppt/slides/slide15.xml><?xml version="1.0" encoding="utf-8"?>
-<p:sld xmlns:a="http://schemas.openxmlformats.org/drawingml/2006/main" xmlns:r="http://schemas.openxmlformats.org/officeDocument/2006/relationships" xmlns:p="http://schemas.openxmlformats.org/presentationml/2006/main">
-  <p:cSld>
-    <p:spTree>
-      <p:nvGrpSpPr>
-        <p:cNvPr id="1" name=""/>
-        <p:cNvGrpSpPr/>
-        <p:nvPr/>
-      </p:nvGrpSpPr>
-      <p:grpSpPr>
-        <a:xfrm>
-          <a:off x="0" y="0"/>
-          <a:ext cx="0" cy="0"/>
-          <a:chOff x="0" y="0"/>
-          <a:chExt cx="0" cy="0"/>
-        </a:xfrm>
-      </p:grpSpPr>
-      <p:sp>
-        <p:nvSpPr>
-          <p:cNvPr id="2" name="Nadpis 1"/>
-          <p:cNvSpPr>
-            <a:spLocks noGrp="1"/>
-          </p:cNvSpPr>
-          <p:nvPr>
-            <p:ph type="title"/>
-          </p:nvPr>
-        </p:nvSpPr>
-        <p:spPr/>
-        <p:txBody>
-          <a:bodyPr/>
-          <a:lstStyle/>
-          <a:p>
-            <a:endParaRPr lang="sk-SK"/>
-          </a:p>
-        </p:txBody>
-      </p:sp>
-      <p:sp>
-        <p:nvSpPr>
-          <p:cNvPr id="3" name="Zástupný symbol obsahu 2"/>
-          <p:cNvSpPr>
-            <a:spLocks noGrp="1"/>
-          </p:cNvSpPr>
-          <p:nvPr>
-            <p:ph idx="1"/>
-          </p:nvPr>
-        </p:nvSpPr>
-        <p:spPr/>
-        <p:txBody>
-          <a:bodyPr/>
-          <a:lstStyle/>
-          <a:p>
-            <a:endParaRPr lang="sk-SK"/>
-          </a:p>
-        </p:txBody>
-      </p:sp>
-      <p:pic>
-        <p:nvPicPr>
-          <p:cNvPr id="4" name="image6.png"/>
-          <p:cNvPicPr/>
-          <p:nvPr/>
-        </p:nvPicPr>
-        <p:blipFill>
-          <a:blip r:embed="rId2"/>
-          <a:srcRect/>
-          <a:stretch>
-            <a:fillRect/>
-          </a:stretch>
-        </p:blipFill>
-        <p:spPr>
-          <a:xfrm>
-            <a:off x="827584" y="116632"/>
-            <a:ext cx="7416823" cy="6624735"/>
-          </a:xfrm>
-          <a:prstGeom prst="rect">
-            <a:avLst/>
-          </a:prstGeom>
-          <a:ln/>
-        </p:spPr>
-      </p:pic>
-    </p:spTree>
-    <p:extLst>
-      <p:ext uri="{BB962C8B-B14F-4D97-AF65-F5344CB8AC3E}">
-        <p14:creationId xmlns:p14="http://schemas.microsoft.com/office/powerpoint/2010/main" val="3934456606"/>
-      </p:ext>
-    </p:extLst>
-  </p:cSld>
-  <p:clrMapOvr>
-    <a:masterClrMapping/>
-  </p:clrMapOvr>
-  <p:timing>
-    <p:tnLst>
-      <p:par>
-        <p:cTn id="1" dur="indefinite" restart="never" nodeType="tmRoot"/>
-      </p:par>
-    </p:tnLst>
-  </p:timing>
-</p:sld>
-</file>
-
-<file path=ppt/slides/slide16.xml><?xml version="1.0" encoding="utf-8"?>
-<p:sld xmlns:a="http://schemas.openxmlformats.org/drawingml/2006/main" xmlns:r="http://schemas.openxmlformats.org/officeDocument/2006/relationships" xmlns:p="http://schemas.openxmlformats.org/presentationml/2006/main">
-  <p:cSld>
-    <p:spTree>
-      <p:nvGrpSpPr>
-        <p:cNvPr id="1" name=""/>
-        <p:cNvGrpSpPr/>
-        <p:nvPr/>
-      </p:nvGrpSpPr>
-      <p:grpSpPr>
-        <a:xfrm>
-          <a:off x="0" y="0"/>
-          <a:ext cx="0" cy="0"/>
-          <a:chOff x="0" y="0"/>
-          <a:chExt cx="0" cy="0"/>
-        </a:xfrm>
-      </p:grpSpPr>
-      <p:sp>
-        <p:nvSpPr>
-          <p:cNvPr id="2" name="Nadpis 1"/>
-          <p:cNvSpPr>
-            <a:spLocks noGrp="1"/>
-          </p:cNvSpPr>
-          <p:nvPr>
-            <p:ph type="title"/>
-          </p:nvPr>
-        </p:nvSpPr>
-        <p:spPr/>
-        <p:txBody>
-          <a:bodyPr/>
-          <a:lstStyle/>
-          <a:p>
-            <a:r>
-              <a:rPr lang="en-GB" dirty="0" smtClean="0"/>
-              <a:t>Non-functional requirements</a:t>
-            </a:r>
-            <a:endParaRPr lang="sk-SK" dirty="0"/>
-          </a:p>
-        </p:txBody>
-      </p:sp>
-      <p:sp>
-        <p:nvSpPr>
-          <p:cNvPr id="3" name="Zástupný symbol obsahu 2"/>
-          <p:cNvSpPr>
-            <a:spLocks noGrp="1"/>
-          </p:cNvSpPr>
-          <p:nvPr>
-            <p:ph idx="1"/>
-          </p:nvPr>
-        </p:nvSpPr>
-        <p:spPr>
-          <a:xfrm>
-            <a:off x="457200" y="1600200"/>
-            <a:ext cx="6203032" cy="4525963"/>
-          </a:xfrm>
-        </p:spPr>
-        <p:txBody>
-          <a:bodyPr>
-            <a:normAutofit/>
-          </a:bodyPr>
-          <a:lstStyle/>
-          <a:p>
-            <a:pPr marL="514350" indent="-514350">
-              <a:buFont typeface="+mj-lt"/>
-              <a:buAutoNum type="arabicPeriod"/>
-            </a:pPr>
-            <a:r>
-              <a:rPr lang="en-US" dirty="0"/>
-              <a:t>The system must be implemented in Java</a:t>
-            </a:r>
-          </a:p>
-          <a:p>
-            <a:pPr marL="514350" indent="-514350">
-              <a:buFont typeface="+mj-lt"/>
-              <a:buAutoNum type="arabicPeriod"/>
-            </a:pPr>
-            <a:r>
-              <a:rPr lang="en-US" dirty="0" smtClean="0"/>
-              <a:t>Secondary </a:t>
-            </a:r>
-            <a:r>
-              <a:rPr lang="en-US" dirty="0"/>
-              <a:t>storage needs to be done with </a:t>
-            </a:r>
-            <a:r>
-              <a:rPr lang="en-US" dirty="0" smtClean="0"/>
-              <a:t>files (Event/Lecturer/</a:t>
-            </a:r>
-            <a:r>
-              <a:rPr lang="en-US" dirty="0" err="1" smtClean="0"/>
-              <a:t>Memberlists</a:t>
-            </a:r>
-            <a:r>
-              <a:rPr lang="en-US" dirty="0" smtClean="0"/>
-              <a:t>, newsletter)</a:t>
-            </a:r>
-            <a:endParaRPr lang="en-US" dirty="0"/>
-          </a:p>
-          <a:p>
-            <a:pPr marL="514350" indent="-514350">
-              <a:buFont typeface="+mj-lt"/>
-              <a:buAutoNum type="arabicPeriod"/>
-            </a:pPr>
-            <a:r>
-              <a:rPr lang="en-US" dirty="0" smtClean="0"/>
-              <a:t>The </a:t>
-            </a:r>
-            <a:r>
-              <a:rPr lang="en-US" dirty="0"/>
-              <a:t>parts of the system must be accessible among </a:t>
-            </a:r>
-            <a:r>
-              <a:rPr lang="en-US" dirty="0" smtClean="0"/>
-              <a:t>them</a:t>
-            </a:r>
-            <a:endParaRPr lang="sk-SK" dirty="0"/>
-          </a:p>
-        </p:txBody>
-      </p:sp>
-      <p:pic>
-        <p:nvPicPr>
-          <p:cNvPr id="11267" name="Picture 3" descr="C:\Users\Acer Matej\Downloads\source-api.png"/>
-          <p:cNvPicPr>
-            <a:picLocks noChangeAspect="1" noChangeArrowheads="1"/>
-          </p:cNvPicPr>
-          <p:nvPr/>
-        </p:nvPicPr>
-        <p:blipFill>
-          <a:blip r:embed="rId2">
-            <a:extLst>
-              <a:ext uri="{28A0092B-C50C-407E-A947-70E740481C1C}">
-                <a14:useLocalDpi xmlns:a14="http://schemas.microsoft.com/office/drawing/2010/main" val="0"/>
-              </a:ext>
-            </a:extLst>
-          </a:blip>
-          <a:srcRect/>
-          <a:stretch>
-            <a:fillRect/>
-          </a:stretch>
-        </p:blipFill>
-        <p:spPr bwMode="auto">
-          <a:xfrm>
-            <a:off x="6804248" y="4437112"/>
-            <a:ext cx="1561728" cy="1561728"/>
-          </a:xfrm>
-          <a:prstGeom prst="rect">
-            <a:avLst/>
-          </a:prstGeom>
-          <a:noFill/>
-          <a:extLst>
-            <a:ext uri="{909E8E84-426E-40DD-AFC4-6F175D3DCCD1}">
-              <a14:hiddenFill xmlns:a14="http://schemas.microsoft.com/office/drawing/2010/main">
-                <a:solidFill>
-                  <a:srgbClr val="FFFFFF"/>
-                </a:solidFill>
-              </a14:hiddenFill>
-            </a:ext>
-          </a:extLst>
-        </p:spPr>
-      </p:pic>
-      <p:pic>
-        <p:nvPicPr>
-          <p:cNvPr id="11268" name="Picture 4"/>
-          <p:cNvPicPr>
-            <a:picLocks noChangeAspect="1" noChangeArrowheads="1"/>
-          </p:cNvPicPr>
-          <p:nvPr/>
-        </p:nvPicPr>
-        <p:blipFill rotWithShape="1">
-          <a:blip r:embed="rId3">
-            <a:extLst>
-              <a:ext uri="{28A0092B-C50C-407E-A947-70E740481C1C}">
-                <a14:useLocalDpi xmlns:a14="http://schemas.microsoft.com/office/drawing/2010/main" val="0"/>
-              </a:ext>
-            </a:extLst>
-          </a:blip>
-          <a:srcRect l="11452" r="11452" b="9488"/>
-          <a:stretch/>
-        </p:blipFill>
-        <p:spPr bwMode="auto">
-          <a:xfrm>
-            <a:off x="6914223" y="3039598"/>
-            <a:ext cx="1341777" cy="1057671"/>
-          </a:xfrm>
-          <a:prstGeom prst="rect">
-            <a:avLst/>
-          </a:prstGeom>
-          <a:ln>
-            <a:noFill/>
-          </a:ln>
-          <a:effectLst>
-            <a:softEdge rad="63500"/>
-          </a:effectLst>
-          <a:extLst>
-            <a:ext uri="{909E8E84-426E-40DD-AFC4-6F175D3DCCD1}">
-              <a14:hiddenFill xmlns:a14="http://schemas.microsoft.com/office/drawing/2010/main">
-                <a:solidFill>
-                  <a:schemeClr val="accent1"/>
-                </a:solidFill>
-              </a14:hiddenFill>
-            </a:ext>
-            <a:ext uri="{91240B29-F687-4F45-9708-019B960494DF}">
-              <a14:hiddenLine xmlns:a14="http://schemas.microsoft.com/office/drawing/2010/main" w="9525">
-                <a:solidFill>
-                  <a:schemeClr val="tx1"/>
-                </a:solidFill>
-                <a:miter lim="800000"/>
-                <a:headEnd/>
-                <a:tailEnd/>
-              </a14:hiddenLine>
-            </a:ext>
-          </a:extLst>
-        </p:spPr>
-      </p:pic>
-      <p:pic>
-        <p:nvPicPr>
-          <p:cNvPr id="11270" name="Picture 6" descr="C:\Users\Acer Matej\Downloads\javareal.jpg.CROP.promo-xlarge2.jpg"/>
-          <p:cNvPicPr>
-            <a:picLocks noChangeAspect="1" noChangeArrowheads="1"/>
-          </p:cNvPicPr>
-          <p:nvPr/>
-        </p:nvPicPr>
-        <p:blipFill rotWithShape="1">
-          <a:blip r:embed="rId4" cstate="print">
-            <a:extLst>
-              <a:ext uri="{28A0092B-C50C-407E-A947-70E740481C1C}">
-                <a14:useLocalDpi xmlns:a14="http://schemas.microsoft.com/office/drawing/2010/main" val="0"/>
-              </a:ext>
-            </a:extLst>
-          </a:blip>
-          <a:srcRect l="21965" r="28150"/>
-          <a:stretch/>
-        </p:blipFill>
-        <p:spPr bwMode="auto">
-          <a:xfrm>
-            <a:off x="7104608" y="1412776"/>
-            <a:ext cx="961007" cy="1374619"/>
-          </a:xfrm>
-          <a:prstGeom prst="rect">
-            <a:avLst/>
-          </a:prstGeom>
-          <a:noFill/>
-          <a:extLst>
-            <a:ext uri="{909E8E84-426E-40DD-AFC4-6F175D3DCCD1}">
-              <a14:hiddenFill xmlns:a14="http://schemas.microsoft.com/office/drawing/2010/main">
-                <a:solidFill>
-                  <a:srgbClr val="FFFFFF"/>
-                </a:solidFill>
-              </a14:hiddenFill>
-            </a:ext>
-          </a:extLst>
-        </p:spPr>
-      </p:pic>
-    </p:spTree>
-    <p:extLst>
-      <p:ext uri="{BB962C8B-B14F-4D97-AF65-F5344CB8AC3E}">
-        <p14:creationId xmlns:p14="http://schemas.microsoft.com/office/powerpoint/2010/main" val="1144001257"/>
-      </p:ext>
-    </p:extLst>
-  </p:cSld>
-  <p:clrMapOvr>
-    <a:masterClrMapping/>
-  </p:clrMapOvr>
-  <p:timing>
-    <p:tnLst>
-      <p:par>
-        <p:cTn id="1" dur="indefinite" restart="never" nodeType="tmRoot"/>
-      </p:par>
-    </p:tnLst>
-  </p:timing>
-</p:sld>
-</file>
-
-<file path=ppt/slides/slide17.xml><?xml version="1.0" encoding="utf-8"?>
-<p:sld xmlns:a="http://schemas.openxmlformats.org/drawingml/2006/main" xmlns:r="http://schemas.openxmlformats.org/officeDocument/2006/relationships" xmlns:p="http://schemas.openxmlformats.org/presentationml/2006/main">
-  <p:cSld>
-    <p:spTree>
-      <p:nvGrpSpPr>
-        <p:cNvPr id="1" name=""/>
-        <p:cNvGrpSpPr/>
-        <p:nvPr/>
-      </p:nvGrpSpPr>
-      <p:grpSpPr>
-        <a:xfrm>
-          <a:off x="0" y="0"/>
-          <a:ext cx="0" cy="0"/>
-          <a:chOff x="0" y="0"/>
-          <a:chExt cx="0" cy="0"/>
-        </a:xfrm>
-      </p:grpSpPr>
-      <p:sp>
-        <p:nvSpPr>
-          <p:cNvPr id="3" name="Zástupný symbol obsahu 2"/>
-          <p:cNvSpPr>
-            <a:spLocks noGrp="1"/>
-          </p:cNvSpPr>
-          <p:nvPr>
-            <p:ph idx="1"/>
-          </p:nvPr>
-        </p:nvSpPr>
-        <p:spPr/>
-        <p:txBody>
-          <a:bodyPr/>
-          <a:lstStyle/>
-          <a:p>
-            <a:endParaRPr lang="sk-SK"/>
-          </a:p>
-        </p:txBody>
-      </p:sp>
-      <p:pic>
-        <p:nvPicPr>
-          <p:cNvPr id="4" name="image11.jpg"/>
-          <p:cNvPicPr/>
-          <p:nvPr/>
-        </p:nvPicPr>
-        <p:blipFill>
-          <a:blip r:embed="rId2"/>
-          <a:srcRect/>
-          <a:stretch>
-            <a:fillRect/>
-          </a:stretch>
-        </p:blipFill>
-        <p:spPr>
-          <a:xfrm>
-            <a:off x="251520" y="116632"/>
-            <a:ext cx="8496944" cy="6669360"/>
-          </a:xfrm>
-          <a:prstGeom prst="rect">
-            <a:avLst/>
-          </a:prstGeom>
-          <a:ln/>
-        </p:spPr>
-      </p:pic>
-      <p:sp>
-        <p:nvSpPr>
-          <p:cNvPr id="2" name="Nadpis 1"/>
-          <p:cNvSpPr>
-            <a:spLocks noGrp="1"/>
-          </p:cNvSpPr>
-          <p:nvPr>
-            <p:ph type="title"/>
-          </p:nvPr>
-        </p:nvSpPr>
-        <p:spPr>
-          <a:xfrm>
-            <a:off x="6217840" y="188640"/>
-            <a:ext cx="2890664" cy="1143000"/>
-          </a:xfrm>
-        </p:spPr>
-        <p:txBody>
-          <a:bodyPr>
-            <a:normAutofit/>
-          </a:bodyPr>
-          <a:lstStyle/>
-          <a:p>
-            <a:r>
-              <a:rPr lang="en-GB" sz="3200" dirty="0" smtClean="0"/>
-              <a:t>USE CASE DIAGRAM</a:t>
-            </a:r>
-            <a:endParaRPr lang="sk-SK" sz="3200" dirty="0"/>
-          </a:p>
-        </p:txBody>
-      </p:sp>
-    </p:spTree>
-    <p:extLst>
-      <p:ext uri="{BB962C8B-B14F-4D97-AF65-F5344CB8AC3E}">
-        <p14:creationId xmlns:p14="http://schemas.microsoft.com/office/powerpoint/2010/main" val="2485981500"/>
-      </p:ext>
-    </p:extLst>
-  </p:cSld>
-  <p:clrMapOvr>
-    <a:masterClrMapping/>
-  </p:clrMapOvr>
-  <p:timing>
-    <p:tnLst>
-      <p:par>
-        <p:cTn id="1" dur="indefinite" restart="never" nodeType="tmRoot"/>
-      </p:par>
-    </p:tnLst>
-  </p:timing>
-</p:sld>
-</file>
-
-<file path=ppt/slides/slide18.xml><?xml version="1.0" encoding="utf-8"?>
-<p:sld xmlns:a="http://schemas.openxmlformats.org/drawingml/2006/main" xmlns:r="http://schemas.openxmlformats.org/officeDocument/2006/relationships" xmlns:p="http://schemas.openxmlformats.org/presentationml/2006/main">
-  <p:cSld>
-    <p:spTree>
-      <p:nvGrpSpPr>
-        <p:cNvPr id="1" name=""/>
-        <p:cNvGrpSpPr/>
-        <p:nvPr/>
-      </p:nvGrpSpPr>
-      <p:grpSpPr>
-        <a:xfrm>
-          <a:off x="0" y="0"/>
-          <a:ext cx="0" cy="0"/>
-          <a:chOff x="0" y="0"/>
-          <a:chExt cx="0" cy="0"/>
-        </a:xfrm>
-      </p:grpSpPr>
-      <p:sp>
-        <p:nvSpPr>
           <p:cNvPr id="3" name="Zástupný symbol obsahu 2"/>
           <p:cNvSpPr>
             <a:spLocks noGrp="1"/>
@@ -4235,7 +3372,7 @@
           <a:p>
             <a:r>
               <a:rPr lang="en-GB" sz="3200" dirty="0" smtClean="0"/>
-              <a:t>ACTIVITY DIAGRAM Create event</a:t>
+              <a:t>ACTIVITY DIAGRAM Plan an event</a:t>
             </a:r>
             <a:endParaRPr lang="sk-SK" sz="3200" dirty="0"/>
           </a:p>
@@ -4261,7 +3398,7 @@
 </p:sld>
 </file>
 
-<file path=ppt/slides/slide19.xml><?xml version="1.0" encoding="utf-8"?>
+<file path=ppt/slides/slide12.xml><?xml version="1.0" encoding="utf-8"?>
 <p:sld xmlns:a="http://schemas.openxmlformats.org/drawingml/2006/main" xmlns:r="http://schemas.openxmlformats.org/officeDocument/2006/relationships" xmlns:p="http://schemas.openxmlformats.org/presentationml/2006/main">
   <p:cSld>
     <p:spTree>
@@ -5689,15 +4826,7 @@
             <a:noFill/>
           </a:ln>
           <a:effectLst/>
-          <a:extLst>
-            <a:ext uri="{909E8E84-426E-40DD-AFC4-6F175D3DCCD1}">
-              <a14:hiddenFill xmlns:a14="http://schemas.microsoft.com/office/drawing/2010/main">
-                <a:solidFill>
-                  <a:schemeClr val="accent1"/>
-                </a:solidFill>
-              </a14:hiddenFill>
-            </a:ext>
-          </a:extLst>
+          <a:extLst/>
         </p:spPr>
       </p:pic>
       <p:sp>
@@ -5876,11 +5005,7 @@
           <a:bodyPr/>
           <a:lstStyle/>
           <a:p>
-            <a:r>
-              <a:rPr lang="en-GB" dirty="0" smtClean="0"/>
-              <a:t>Member/Participant</a:t>
-            </a:r>
-            <a:endParaRPr lang="sk-SK" dirty="0"/>
+            <a:endParaRPr lang="sk-SK"/>
           </a:p>
         </p:txBody>
       </p:sp>
@@ -5899,45 +5024,42 @@
           <a:bodyPr/>
           <a:lstStyle/>
           <a:p>
-            <a:r>
-              <a:rPr lang="en-GB" dirty="0" smtClean="0"/>
-              <a:t>Store info about new member</a:t>
-            </a:r>
-          </a:p>
-          <a:p>
-            <a:r>
-              <a:rPr lang="en-GB" dirty="0" smtClean="0"/>
-              <a:t>Generate list of emails of members who have not paid</a:t>
-            </a:r>
-          </a:p>
-          <a:p>
-            <a:r>
-              <a:rPr lang="en-US" dirty="0" smtClean="0"/>
-              <a:t>Count the </a:t>
-            </a:r>
-            <a:r>
-              <a:rPr lang="en-US" dirty="0"/>
-              <a:t>price for members, having considered the discount for </a:t>
-            </a:r>
-            <a:r>
-              <a:rPr lang="en-US" dirty="0" smtClean="0"/>
-              <a:t>events</a:t>
-            </a:r>
-            <a:endParaRPr lang="en-GB" dirty="0" smtClean="0"/>
-          </a:p>
-          <a:p>
-            <a:r>
-              <a:rPr lang="en-GB" dirty="0" smtClean="0"/>
-              <a:t>Sign up member/participant to an event</a:t>
-            </a:r>
-            <a:endParaRPr lang="sk-SK" dirty="0"/>
-          </a:p>
-        </p:txBody>
-      </p:sp>
+            <a:endParaRPr lang="sk-SK"/>
+          </a:p>
+        </p:txBody>
+      </p:sp>
+      <p:pic>
+        <p:nvPicPr>
+          <p:cNvPr id="4" name="image15.png"/>
+          <p:cNvPicPr/>
+          <p:nvPr/>
+        </p:nvPicPr>
+        <p:blipFill>
+          <a:blip r:embed="rId2"/>
+          <a:srcRect/>
+          <a:stretch>
+            <a:fillRect/>
+          </a:stretch>
+        </p:blipFill>
+        <p:spPr>
+          <a:xfrm>
+            <a:off x="683568" y="116632"/>
+            <a:ext cx="7632848" cy="6624736"/>
+          </a:xfrm>
+          <a:prstGeom prst="rect">
+            <a:avLst/>
+          </a:prstGeom>
+          <a:ln w="12700">
+            <a:solidFill>
+              <a:schemeClr val="tx1"/>
+            </a:solidFill>
+          </a:ln>
+        </p:spPr>
+      </p:pic>
     </p:spTree>
     <p:extLst>
       <p:ext uri="{BB962C8B-B14F-4D97-AF65-F5344CB8AC3E}">
-        <p14:creationId xmlns:p14="http://schemas.microsoft.com/office/powerpoint/2010/main" val="1662673426"/>
+        <p14:creationId xmlns:p14="http://schemas.microsoft.com/office/powerpoint/2010/main" val="984753232"/>
       </p:ext>
     </p:extLst>
   </p:cSld>
@@ -5986,7 +5108,11 @@
           <a:bodyPr/>
           <a:lstStyle/>
           <a:p>
-            <a:endParaRPr lang="sk-SK"/>
+            <a:r>
+              <a:rPr lang="en-GB" dirty="0" smtClean="0"/>
+              <a:t>Non-functional requirements</a:t>
+            </a:r>
+            <a:endParaRPr lang="sk-SK" dirty="0"/>
           </a:p>
         </p:txBody>
       </p:sp>
@@ -6000,43 +5126,218 @@
             <p:ph idx="1"/>
           </p:nvPr>
         </p:nvSpPr>
-        <p:spPr/>
-        <p:txBody>
-          <a:bodyPr/>
-          <a:lstStyle/>
-          <a:p>
-            <a:endParaRPr lang="sk-SK"/>
+        <p:spPr>
+          <a:xfrm>
+            <a:off x="457200" y="1340768"/>
+            <a:ext cx="6203032" cy="4525963"/>
+          </a:xfrm>
+        </p:spPr>
+        <p:txBody>
+          <a:bodyPr anchor="ctr">
+            <a:normAutofit/>
+          </a:bodyPr>
+          <a:lstStyle/>
+          <a:p>
+            <a:pPr marL="514350" indent="-514350">
+              <a:spcAft>
+                <a:spcPts val="1800"/>
+              </a:spcAft>
+              <a:buFont typeface="+mj-lt"/>
+              <a:buAutoNum type="arabicPeriod"/>
+            </a:pPr>
+            <a:r>
+              <a:rPr lang="en-US" dirty="0"/>
+              <a:t>The system must be implemented in </a:t>
+            </a:r>
+            <a:r>
+              <a:rPr lang="en-US" dirty="0" smtClean="0"/>
+              <a:t>Java</a:t>
+            </a:r>
+            <a:endParaRPr lang="en-US" dirty="0"/>
+          </a:p>
+          <a:p>
+            <a:pPr marL="514350" indent="-514350">
+              <a:spcAft>
+                <a:spcPts val="1800"/>
+              </a:spcAft>
+              <a:buFont typeface="+mj-lt"/>
+              <a:buAutoNum type="arabicPeriod"/>
+            </a:pPr>
+            <a:r>
+              <a:rPr lang="en-US" dirty="0" smtClean="0"/>
+              <a:t>Secondary </a:t>
+            </a:r>
+            <a:r>
+              <a:rPr lang="en-US" dirty="0"/>
+              <a:t>storage needs to be done with </a:t>
+            </a:r>
+            <a:r>
+              <a:rPr lang="en-US" dirty="0" smtClean="0"/>
+              <a:t>files </a:t>
+            </a:r>
+          </a:p>
+          <a:p>
+            <a:pPr marL="514350" indent="-514350">
+              <a:spcAft>
+                <a:spcPts val="1800"/>
+              </a:spcAft>
+              <a:buFont typeface="+mj-lt"/>
+              <a:buAutoNum type="arabicPeriod"/>
+            </a:pPr>
+            <a:r>
+              <a:rPr lang="en-US" dirty="0" smtClean="0"/>
+              <a:t>The </a:t>
+            </a:r>
+            <a:r>
+              <a:rPr lang="en-US" dirty="0"/>
+              <a:t>parts of the system must be accessible among </a:t>
+            </a:r>
+            <a:r>
+              <a:rPr lang="en-US" dirty="0" smtClean="0"/>
+              <a:t>them</a:t>
+            </a:r>
+            <a:endParaRPr lang="sk-SK" dirty="0"/>
           </a:p>
         </p:txBody>
       </p:sp>
       <p:pic>
         <p:nvPicPr>
-          <p:cNvPr id="5" name="image16.png"/>
-          <p:cNvPicPr/>
+          <p:cNvPr id="11267" name="Picture 3" descr="C:\Users\Acer Matej\Downloads\source-api.png"/>
+          <p:cNvPicPr>
+            <a:picLocks noChangeAspect="1" noChangeArrowheads="1"/>
+          </p:cNvPicPr>
           <p:nvPr/>
         </p:nvPicPr>
         <p:blipFill>
-          <a:blip r:embed="rId2"/>
+          <a:blip r:embed="rId2">
+            <a:extLst>
+              <a:ext uri="{28A0092B-C50C-407E-A947-70E740481C1C}">
+                <a14:useLocalDpi xmlns:a14="http://schemas.microsoft.com/office/drawing/2010/main" val="0"/>
+              </a:ext>
+            </a:extLst>
+          </a:blip>
           <a:srcRect/>
           <a:stretch>
             <a:fillRect/>
           </a:stretch>
         </p:blipFill>
-        <p:spPr>
+        <p:spPr bwMode="auto">
           <a:xfrm>
-            <a:off x="539552" y="116632"/>
-            <a:ext cx="8064896" cy="6624736"/>
+            <a:off x="6804248" y="4437112"/>
+            <a:ext cx="1561728" cy="1561728"/>
           </a:xfrm>
           <a:prstGeom prst="rect">
             <a:avLst/>
           </a:prstGeom>
-          <a:ln/>
+          <a:noFill/>
+          <a:extLst>
+            <a:ext uri="{909E8E84-426E-40DD-AFC4-6F175D3DCCD1}">
+              <a14:hiddenFill xmlns:a14="http://schemas.microsoft.com/office/drawing/2010/main">
+                <a:solidFill>
+                  <a:srgbClr val="FFFFFF"/>
+                </a:solidFill>
+              </a14:hiddenFill>
+            </a:ext>
+          </a:extLst>
+        </p:spPr>
+      </p:pic>
+      <p:pic>
+        <p:nvPicPr>
+          <p:cNvPr id="11268" name="Picture 4"/>
+          <p:cNvPicPr>
+            <a:picLocks noChangeAspect="1" noChangeArrowheads="1"/>
+          </p:cNvPicPr>
+          <p:nvPr/>
+        </p:nvPicPr>
+        <p:blipFill rotWithShape="1">
+          <a:blip r:embed="rId3">
+            <a:extLst>
+              <a:ext uri="{28A0092B-C50C-407E-A947-70E740481C1C}">
+                <a14:useLocalDpi xmlns:a14="http://schemas.microsoft.com/office/drawing/2010/main" val="0"/>
+              </a:ext>
+            </a:extLst>
+          </a:blip>
+          <a:srcRect l="11452" r="11452" b="9488"/>
+          <a:stretch/>
+        </p:blipFill>
+        <p:spPr bwMode="auto">
+          <a:xfrm>
+            <a:off x="6914223" y="3039598"/>
+            <a:ext cx="1341777" cy="1057671"/>
+          </a:xfrm>
+          <a:prstGeom prst="rect">
+            <a:avLst/>
+          </a:prstGeom>
+          <a:ln>
+            <a:noFill/>
+          </a:ln>
+          <a:effectLst>
+            <a:softEdge rad="63500"/>
+          </a:effectLst>
+          <a:extLst>
+            <a:ext uri="{909E8E84-426E-40DD-AFC4-6F175D3DCCD1}">
+              <a14:hiddenFill xmlns:a14="http://schemas.microsoft.com/office/drawing/2010/main">
+                <a:solidFill>
+                  <a:schemeClr val="accent1"/>
+                </a:solidFill>
+              </a14:hiddenFill>
+            </a:ext>
+            <a:ext uri="{91240B29-F687-4F45-9708-019B960494DF}">
+              <a14:hiddenLine xmlns:a14="http://schemas.microsoft.com/office/drawing/2010/main" w="9525">
+                <a:solidFill>
+                  <a:schemeClr val="tx1"/>
+                </a:solidFill>
+                <a:miter lim="800000"/>
+                <a:headEnd/>
+                <a:tailEnd/>
+              </a14:hiddenLine>
+            </a:ext>
+          </a:extLst>
+        </p:spPr>
+      </p:pic>
+      <p:pic>
+        <p:nvPicPr>
+          <p:cNvPr id="11270" name="Picture 6" descr="C:\Users\Acer Matej\Downloads\javareal.jpg.CROP.promo-xlarge2.jpg"/>
+          <p:cNvPicPr>
+            <a:picLocks noChangeAspect="1" noChangeArrowheads="1"/>
+          </p:cNvPicPr>
+          <p:nvPr/>
+        </p:nvPicPr>
+        <p:blipFill rotWithShape="1">
+          <a:blip r:embed="rId4" cstate="print">
+            <a:extLst>
+              <a:ext uri="{28A0092B-C50C-407E-A947-70E740481C1C}">
+                <a14:useLocalDpi xmlns:a14="http://schemas.microsoft.com/office/drawing/2010/main" val="0"/>
+              </a:ext>
+            </a:extLst>
+          </a:blip>
+          <a:srcRect l="21965" r="28150"/>
+          <a:stretch/>
+        </p:blipFill>
+        <p:spPr bwMode="auto">
+          <a:xfrm>
+            <a:off x="7104608" y="1412776"/>
+            <a:ext cx="961007" cy="1374619"/>
+          </a:xfrm>
+          <a:prstGeom prst="rect">
+            <a:avLst/>
+          </a:prstGeom>
+          <a:noFill/>
+          <a:extLst>
+            <a:ext uri="{909E8E84-426E-40DD-AFC4-6F175D3DCCD1}">
+              <a14:hiddenFill xmlns:a14="http://schemas.microsoft.com/office/drawing/2010/main">
+                <a:solidFill>
+                  <a:srgbClr val="FFFFFF"/>
+                </a:solidFill>
+              </a14:hiddenFill>
+            </a:ext>
+          </a:extLst>
         </p:spPr>
       </p:pic>
     </p:spTree>
     <p:extLst>
       <p:ext uri="{BB962C8B-B14F-4D97-AF65-F5344CB8AC3E}">
-        <p14:creationId xmlns:p14="http://schemas.microsoft.com/office/powerpoint/2010/main" val="326808985"/>
+        <p14:creationId xmlns:p14="http://schemas.microsoft.com/office/powerpoint/2010/main" val="1144001257"/>
       </p:ext>
     </p:extLst>
   </p:cSld>

</xml_diff>